<commit_message>
general readme and powerpoint updates
</commit_message>
<xml_diff>
--- a/Stephen_Stark_New_Market_Analysis_Report.pptx
+++ b/Stephen_Stark_New_Market_Analysis_Report.pptx
@@ -5546,7 +5546,7 @@
           <a:p>
             <a:fld id="{5033F209-9216-9F43-BCDE-52232DFF55E2}" type="datetimeFigureOut">
               <a:rPr lang="en-US" smtClean="0"/>
-              <a:t>10/9/20</a:t>
+              <a:t>11/19/20</a:t>
             </a:fld>
             <a:endParaRPr lang="en-US" dirty="0"/>
           </a:p>
@@ -6131,7 +6131,7 @@
           <a:p>
             <a:fld id="{39D1BB5D-E72A-FD4A-A442-7EA154EF6045}" type="datetime1">
               <a:rPr lang="en-US" smtClean="0"/>
-              <a:t>10/9/20</a:t>
+              <a:t>11/19/20</a:t>
             </a:fld>
             <a:endParaRPr lang="en-US" dirty="0"/>
           </a:p>
@@ -6343,7 +6343,7 @@
           <a:p>
             <a:fld id="{D8D3179C-6261-CF4E-B9FF-626B81544066}" type="datetime1">
               <a:rPr lang="en-US" smtClean="0"/>
-              <a:t>10/9/20</a:t>
+              <a:t>11/19/20</a:t>
             </a:fld>
             <a:endParaRPr lang="en-US" dirty="0"/>
           </a:p>
@@ -6555,7 +6555,7 @@
           <a:p>
             <a:fld id="{62CEC35B-22C7-5E48-B8F2-B245452DB208}" type="datetime1">
               <a:rPr lang="en-US" smtClean="0"/>
-              <a:t>10/9/20</a:t>
+              <a:t>11/19/20</a:t>
             </a:fld>
             <a:endParaRPr lang="en-US" dirty="0"/>
           </a:p>
@@ -6767,7 +6767,7 @@
           <a:p>
             <a:fld id="{E5CD1CEB-807C-3643-B077-B77E233F7CDB}" type="datetime1">
               <a:rPr lang="en-US" smtClean="0"/>
-              <a:t>10/9/20</a:t>
+              <a:t>11/19/20</a:t>
             </a:fld>
             <a:endParaRPr lang="en-US" dirty="0"/>
           </a:p>
@@ -7047,7 +7047,7 @@
           <a:p>
             <a:fld id="{BC7E46C4-5E79-504C-BEC3-92478324900C}" type="datetime1">
               <a:rPr lang="en-US" smtClean="0"/>
-              <a:t>10/9/20</a:t>
+              <a:t>11/19/20</a:t>
             </a:fld>
             <a:endParaRPr lang="en-US" dirty="0"/>
           </a:p>
@@ -7321,7 +7321,7 @@
           <a:p>
             <a:fld id="{71C3B0EA-06F7-9648-BCB9-BAACAAE7DB4B}" type="datetime1">
               <a:rPr lang="en-US" smtClean="0"/>
-              <a:t>10/9/20</a:t>
+              <a:t>11/19/20</a:t>
             </a:fld>
             <a:endParaRPr lang="en-US" dirty="0"/>
           </a:p>
@@ -7737,7 +7737,7 @@
           <a:p>
             <a:fld id="{83468B6D-EB98-174E-ADAD-6BC07C5FC72A}" type="datetime1">
               <a:rPr lang="en-US" smtClean="0"/>
-              <a:t>10/9/20</a:t>
+              <a:t>11/19/20</a:t>
             </a:fld>
             <a:endParaRPr lang="en-US" dirty="0"/>
           </a:p>
@@ -7887,7 +7887,7 @@
           <a:p>
             <a:fld id="{831A5B11-8C50-974B-9D3D-D80DBB7BAD48}" type="datetime1">
               <a:rPr lang="en-US" smtClean="0"/>
-              <a:t>10/9/20</a:t>
+              <a:t>11/19/20</a:t>
             </a:fld>
             <a:endParaRPr lang="en-US" dirty="0"/>
           </a:p>
@@ -8004,7 +8004,7 @@
           <a:p>
             <a:fld id="{4CDCBED0-1364-8B45-864F-6F3DBCE1126C}" type="datetime1">
               <a:rPr lang="en-US" smtClean="0"/>
-              <a:t>10/9/20</a:t>
+              <a:t>11/19/20</a:t>
             </a:fld>
             <a:endParaRPr lang="en-US" dirty="0"/>
           </a:p>
@@ -8319,7 +8319,7 @@
           <a:p>
             <a:fld id="{66EDCA37-87DA-D741-98B3-FA6232C3939C}" type="datetime1">
               <a:rPr lang="en-US" smtClean="0"/>
-              <a:t>10/9/20</a:t>
+              <a:t>11/19/20</a:t>
             </a:fld>
             <a:endParaRPr lang="en-US" dirty="0"/>
           </a:p>
@@ -8611,7 +8611,7 @@
           <a:p>
             <a:fld id="{EA820F33-F562-A14F-AA6D-B64B867BB538}" type="datetime1">
               <a:rPr lang="en-US" smtClean="0"/>
-              <a:t>10/9/20</a:t>
+              <a:t>11/19/20</a:t>
             </a:fld>
             <a:endParaRPr lang="en-US" dirty="0"/>
           </a:p>
@@ -8856,7 +8856,7 @@
           <a:p>
             <a:fld id="{04577862-A8A8-BC44-BEF0-EA8F5C803850}" type="datetime1">
               <a:rPr lang="en-US" smtClean="0"/>
-              <a:t>10/9/20</a:t>
+              <a:t>11/19/20</a:t>
             </a:fld>
             <a:endParaRPr lang="en-US" dirty="0"/>
           </a:p>
@@ -9352,61 +9352,23 @@
           <a:p>
             <a:pPr algn="l"/>
             <a:r>
-              <a:rPr lang="en-US" b="1"/>
+              <a:rPr lang="en-US" b="1" dirty="0"/>
               <a:t>Stephen Stark</a:t>
             </a:r>
           </a:p>
           <a:p>
             <a:pPr algn="l"/>
             <a:r>
-              <a:rPr lang="en-US"/>
+              <a:rPr lang="en-US" dirty="0"/>
               <a:t>October 2020</a:t>
             </a:r>
           </a:p>
           <a:p>
             <a:pPr algn="l"/>
-            <a:endParaRPr lang="en-US"/>
-          </a:p>
-          <a:p>
-            <a:pPr algn="l"/>
-            <a:r>
-              <a:rPr lang="en-US"/>
-              <a:t>Presented to:</a:t>
-            </a:r>
             <a:endParaRPr lang="en-US" dirty="0"/>
           </a:p>
         </p:txBody>
       </p:sp>
-      <p:pic>
-        <p:nvPicPr>
-          <p:cNvPr id="8" name="Picture 7">
-            <a:extLst>
-              <a:ext uri="{FF2B5EF4-FFF2-40B4-BE49-F238E27FC236}">
-                <a16:creationId xmlns:a16="http://schemas.microsoft.com/office/drawing/2014/main" id="{F35D68A1-2EAF-754E-9AA8-AB7741E1E230}"/>
-              </a:ext>
-            </a:extLst>
-          </p:cNvPr>
-          <p:cNvPicPr>
-            <a:picLocks noChangeAspect="1"/>
-          </p:cNvPicPr>
-          <p:nvPr/>
-        </p:nvPicPr>
-        <p:blipFill>
-          <a:blip r:embed="rId2"/>
-          <a:stretch>
-            <a:fillRect/>
-          </a:stretch>
-        </p:blipFill>
-        <p:spPr>
-          <a:xfrm>
-            <a:off x="1323975" y="5172727"/>
-            <a:ext cx="2975102" cy="1125819"/>
-          </a:xfrm>
-          <a:prstGeom prst="rect">
-            <a:avLst/>
-          </a:prstGeom>
-        </p:spPr>
-      </p:pic>
     </p:spTree>
     <p:extLst>
       <p:ext uri="{BB962C8B-B14F-4D97-AF65-F5344CB8AC3E}">

</xml_diff>